<commit_message>
Update Aplikasi Suhu Tubuh FIX.pptx
</commit_message>
<xml_diff>
--- a/BluePrint/Aplikasi Suhu Tubuh FIX.pptx
+++ b/BluePrint/Aplikasi Suhu Tubuh FIX.pptx
@@ -15,8 +15,8 @@
     <p:sldId id="288" r:id="rId6"/>
     <p:sldId id="289" r:id="rId7"/>
     <p:sldId id="290" r:id="rId8"/>
-    <p:sldId id="291" r:id="rId9"/>
-    <p:sldId id="293" r:id="rId10"/>
+    <p:sldId id="293" r:id="rId9"/>
+    <p:sldId id="291" r:id="rId10"/>
     <p:sldId id="292" r:id="rId11"/>
     <p:sldId id="285" r:id="rId12"/>
   </p:sldIdLst>
@@ -1107,7 +1107,7 @@
     </p:spTree>
     <p:extLst>
       <p:ext uri="{BB962C8B-B14F-4D97-AF65-F5344CB8AC3E}">
-        <p14:creationId xmlns:p14="http://schemas.microsoft.com/office/powerpoint/2010/main" val="3314705921"/>
+        <p14:creationId xmlns:p14="http://schemas.microsoft.com/office/powerpoint/2010/main" val="2623608925"/>
       </p:ext>
     </p:extLst>
   </p:cSld>
@@ -1191,7 +1191,7 @@
     </p:spTree>
     <p:extLst>
       <p:ext uri="{BB962C8B-B14F-4D97-AF65-F5344CB8AC3E}">
-        <p14:creationId xmlns:p14="http://schemas.microsoft.com/office/powerpoint/2010/main" val="2623608925"/>
+        <p14:creationId xmlns:p14="http://schemas.microsoft.com/office/powerpoint/2010/main" val="3314705921"/>
       </p:ext>
     </p:extLst>
   </p:cSld>
@@ -29199,7 +29199,7 @@
                   </a:schemeClr>
                 </a:solidFill>
               </a:rPr>
-              <a:t>BPMN</a:t>
+              <a:t>ACTIVITY DIAGRAM</a:t>
             </a:r>
             <a:br>
               <a:rPr lang="en-US" sz="2800" dirty="0">
@@ -36365,10 +36365,10 @@
       </p:grpSp>
       <p:pic>
         <p:nvPicPr>
-          <p:cNvPr id="3" name="Picture 2" descr="Diagram, schematic&#10;&#10;Description automatically generated">
+          <p:cNvPr id="5" name="Picture 4" descr="Diagram&#10;&#10;Description automatically generated">
             <a:extLst>
               <a:ext uri="{FF2B5EF4-FFF2-40B4-BE49-F238E27FC236}">
-                <a16:creationId xmlns:a16="http://schemas.microsoft.com/office/drawing/2014/main" id="{45ABA0E1-40D9-4DA8-8880-56B9E904E105}"/>
+                <a16:creationId xmlns:a16="http://schemas.microsoft.com/office/drawing/2014/main" id="{C4E52587-EB16-49A0-9925-E3798F3C4EC8}"/>
               </a:ext>
             </a:extLst>
           </p:cNvPr>
@@ -36385,13 +36385,13 @@
               </a:ext>
             </a:extLst>
           </a:blip>
-          <a:srcRect l="17942"/>
+          <a:srcRect l="17426"/>
           <a:stretch/>
         </p:blipFill>
         <p:spPr>
           <a:xfrm>
-            <a:off x="379935" y="879986"/>
-            <a:ext cx="11432130" cy="5242901"/>
+            <a:off x="341487" y="855297"/>
+            <a:ext cx="11509025" cy="5245266"/>
           </a:xfrm>
           <a:prstGeom prst="rect">
             <a:avLst/>
@@ -36401,7 +36401,7 @@
     </p:spTree>
     <p:extLst>
       <p:ext uri="{BB962C8B-B14F-4D97-AF65-F5344CB8AC3E}">
-        <p14:creationId xmlns:p14="http://schemas.microsoft.com/office/powerpoint/2010/main" val="2296679694"/>
+        <p14:creationId xmlns:p14="http://schemas.microsoft.com/office/powerpoint/2010/main" val="4053941695"/>
       </p:ext>
     </p:extLst>
   </p:cSld>
@@ -36570,7 +36570,7 @@
                   </a:schemeClr>
                 </a:solidFill>
               </a:rPr>
-              <a:t>ACTIVITY DIAGRAM</a:t>
+              <a:t>BPMN</a:t>
             </a:r>
             <a:br>
               <a:rPr lang="en-US" sz="2800" dirty="0">
@@ -43736,10 +43736,10 @@
       </p:grpSp>
       <p:pic>
         <p:nvPicPr>
-          <p:cNvPr id="5" name="Picture 4" descr="Diagram&#10;&#10;Description automatically generated">
+          <p:cNvPr id="3" name="Picture 2" descr="Diagram, schematic&#10;&#10;Description automatically generated">
             <a:extLst>
               <a:ext uri="{FF2B5EF4-FFF2-40B4-BE49-F238E27FC236}">
-                <a16:creationId xmlns:a16="http://schemas.microsoft.com/office/drawing/2014/main" id="{C4E52587-EB16-49A0-9925-E3798F3C4EC8}"/>
+                <a16:creationId xmlns:a16="http://schemas.microsoft.com/office/drawing/2014/main" id="{45ABA0E1-40D9-4DA8-8880-56B9E904E105}"/>
               </a:ext>
             </a:extLst>
           </p:cNvPr>
@@ -43756,13 +43756,13 @@
               </a:ext>
             </a:extLst>
           </a:blip>
-          <a:srcRect l="17426"/>
+          <a:srcRect l="17942"/>
           <a:stretch/>
         </p:blipFill>
         <p:spPr>
           <a:xfrm>
-            <a:off x="341487" y="855297"/>
-            <a:ext cx="11509025" cy="5245266"/>
+            <a:off x="379935" y="879986"/>
+            <a:ext cx="11432130" cy="5242901"/>
           </a:xfrm>
           <a:prstGeom prst="rect">
             <a:avLst/>
@@ -43772,7 +43772,7 @@
     </p:spTree>
     <p:extLst>
       <p:ext uri="{BB962C8B-B14F-4D97-AF65-F5344CB8AC3E}">
-        <p14:creationId xmlns:p14="http://schemas.microsoft.com/office/powerpoint/2010/main" val="4053941695"/>
+        <p14:creationId xmlns:p14="http://schemas.microsoft.com/office/powerpoint/2010/main" val="2296679694"/>
       </p:ext>
     </p:extLst>
   </p:cSld>
@@ -43854,8 +43854,8 @@
         </p:nvCxnSpPr>
         <p:spPr>
           <a:xfrm>
-            <a:off x="8105775" y="522898"/>
-            <a:ext cx="4086225" cy="0"/>
+            <a:off x="8453718" y="522898"/>
+            <a:ext cx="3738282" cy="0"/>
           </a:xfrm>
           <a:prstGeom prst="line">
             <a:avLst/>
@@ -43941,7 +43941,7 @@
                   </a:schemeClr>
                 </a:solidFill>
               </a:rPr>
-              <a:t>TAHAPAN PROTOTYPE</a:t>
+              <a:t>TAHAPAN SD:C PROTOTYPE</a:t>
             </a:r>
             <a:br>
               <a:rPr lang="en-US" sz="2800" dirty="0">
@@ -43983,7 +43983,7 @@
         </p:nvCxnSpPr>
         <p:spPr>
           <a:xfrm>
-            <a:off x="0" y="522898"/>
+            <a:off x="-290513" y="534808"/>
             <a:ext cx="4086225" cy="0"/>
           </a:xfrm>
           <a:prstGeom prst="line">
@@ -46671,23 +46671,6 @@
 </file>
 
 <file path=customXml/item1.xml><?xml version="1.0" encoding="utf-8"?>
-<?mso-contentType ?>
-<FormTemplates xmlns="http://schemas.microsoft.com/sharepoint/v3/contenttype/forms">
-  <Display>DocumentLibraryForm</Display>
-  <Edit>DocumentLibraryForm</Edit>
-  <New>DocumentLibraryForm</New>
-</FormTemplates>
-</file>
-
-<file path=customXml/item2.xml><?xml version="1.0" encoding="utf-8"?>
-<p:properties xmlns:p="http://schemas.microsoft.com/office/2006/metadata/properties" xmlns:xsi="http://www.w3.org/2001/XMLSchema-instance" xmlns:pc="http://schemas.microsoft.com/office/infopath/2007/PartnerControls">
-  <documentManagement>
-    <MediaServiceKeyPoints xmlns="71af3243-3dd4-4a8d-8c0d-dd76da1f02a5" xsi:nil="true"/>
-  </documentManagement>
-</p:properties>
-</file>
-
-<file path=customXml/item3.xml><?xml version="1.0" encoding="utf-8"?>
 <ct:contentTypeSchema xmlns:ct="http://schemas.microsoft.com/office/2006/metadata/contentType" xmlns:ma="http://schemas.microsoft.com/office/2006/metadata/properties/metaAttributes" ct:_="" ma:_="" ma:contentTypeName="Document" ma:contentTypeID="0x01010079F111ED35F8CC479449609E8A0923A6" ma:contentTypeVersion="11" ma:contentTypeDescription="Create a new document." ma:contentTypeScope="" ma:versionID="9677210f24a1be23c92c90fd886aa0aa">
   <xsd:schema xmlns:xsd="http://www.w3.org/2001/XMLSchema" xmlns:xs="http://www.w3.org/2001/XMLSchema" xmlns:p="http://schemas.microsoft.com/office/2006/metadata/properties" xmlns:ns2="71af3243-3dd4-4a8d-8c0d-dd76da1f02a5" xmlns:ns3="16c05727-aa75-4e4a-9b5f-8a80a1165891" targetNamespace="http://schemas.microsoft.com/office/2006/metadata/properties" ma:root="true" ma:fieldsID="60e05723c5c1908df1a1a4ebf11d344e" ns2:_="" ns3:_="">
     <xsd:import namespace="71af3243-3dd4-4a8d-8c0d-dd76da1f02a5"/>
@@ -46898,25 +46881,24 @@
 </ct:contentTypeSchema>
 </file>
 
-<file path=customXml/itemProps1.xml><?xml version="1.0" encoding="utf-8"?>
-<ds:datastoreItem xmlns:ds="http://schemas.openxmlformats.org/officeDocument/2006/customXml" ds:itemID="{2FD05317-60D6-4B3A-8545-888496D1A8EC}">
-  <ds:schemaRefs>
-    <ds:schemaRef ds:uri="http://schemas.microsoft.com/sharepoint/v3/contenttype/forms"/>
-  </ds:schemaRefs>
-</ds:datastoreItem>
+<file path=customXml/item2.xml><?xml version="1.0" encoding="utf-8"?>
+<p:properties xmlns:p="http://schemas.microsoft.com/office/2006/metadata/properties" xmlns:xsi="http://www.w3.org/2001/XMLSchema-instance" xmlns:pc="http://schemas.microsoft.com/office/infopath/2007/PartnerControls">
+  <documentManagement>
+    <MediaServiceKeyPoints xmlns="71af3243-3dd4-4a8d-8c0d-dd76da1f02a5" xsi:nil="true"/>
+  </documentManagement>
+</p:properties>
 </file>
 
-<file path=customXml/itemProps2.xml><?xml version="1.0" encoding="utf-8"?>
-<ds:datastoreItem xmlns:ds="http://schemas.openxmlformats.org/officeDocument/2006/customXml" ds:itemID="{EF609EDA-869E-4BE5-AE5D-B898C584B6FF}">
-  <ds:schemaRefs>
-    <ds:schemaRef ds:uri="http://schemas.microsoft.com/office/2006/metadata/properties"/>
-    <ds:schemaRef ds:uri="http://schemas.microsoft.com/office/infopath/2007/PartnerControls"/>
-    <ds:schemaRef ds:uri="71af3243-3dd4-4a8d-8c0d-dd76da1f02a5"/>
-  </ds:schemaRefs>
-</ds:datastoreItem>
+<file path=customXml/item3.xml><?xml version="1.0" encoding="utf-8"?>
+<?mso-contentType ?>
+<FormTemplates xmlns="http://schemas.microsoft.com/sharepoint/v3/contenttype/forms">
+  <Display>DocumentLibraryForm</Display>
+  <Edit>DocumentLibraryForm</Edit>
+  <New>DocumentLibraryForm</New>
+</FormTemplates>
 </file>
 
-<file path=customXml/itemProps3.xml><?xml version="1.0" encoding="utf-8"?>
+<file path=customXml/itemProps1.xml><?xml version="1.0" encoding="utf-8"?>
 <ds:datastoreItem xmlns:ds="http://schemas.openxmlformats.org/officeDocument/2006/customXml" ds:itemID="{61A00BBF-EEBB-4E18-B8CB-F926EAAC48F7}">
   <ds:schemaRefs>
     <ds:schemaRef ds:uri="http://schemas.microsoft.com/office/2006/metadata/contentType"/>
@@ -46933,4 +46915,22 @@
     <ds:schemaRef ds:uri="http://schemas.microsoft.com/internal/obd"/>
   </ds:schemaRefs>
 </ds:datastoreItem>
+</file>
+
+<file path=customXml/itemProps2.xml><?xml version="1.0" encoding="utf-8"?>
+<ds:datastoreItem xmlns:ds="http://schemas.openxmlformats.org/officeDocument/2006/customXml" ds:itemID="{EF609EDA-869E-4BE5-AE5D-B898C584B6FF}">
+  <ds:schemaRefs>
+    <ds:schemaRef ds:uri="http://schemas.microsoft.com/office/2006/metadata/properties"/>
+    <ds:schemaRef ds:uri="http://schemas.microsoft.com/office/infopath/2007/PartnerControls"/>
+    <ds:schemaRef ds:uri="71af3243-3dd4-4a8d-8c0d-dd76da1f02a5"/>
+  </ds:schemaRefs>
+</ds:datastoreItem>
+</file>
+
+<file path=customXml/itemProps3.xml><?xml version="1.0" encoding="utf-8"?>
+<ds:datastoreItem xmlns:ds="http://schemas.openxmlformats.org/officeDocument/2006/customXml" ds:itemID="{2FD05317-60D6-4B3A-8545-888496D1A8EC}">
+  <ds:schemaRefs>
+    <ds:schemaRef ds:uri="http://schemas.microsoft.com/sharepoint/v3/contenttype/forms"/>
+  </ds:schemaRefs>
+</ds:datastoreItem>
 </file>
</xml_diff>